<commit_message>
Updated For TD Documents
Updated For Transition Diagram Documents to be merged with TD docu.
</commit_message>
<xml_diff>
--- a/DOCUMENTATION/For Transitional Diagram.pptx
+++ b/DOCUMENTATION/For Transitional Diagram.pptx
@@ -195,7 +195,7 @@
             <a:fld id="{7CB27C51-5E54-45B1-B484-0934B2F281E4}" type="datetimeFigureOut">
               <a:rPr lang="en-US" smtClean="0"/>
               <a:pPr/>
-              <a:t>7/31/2016</a:t>
+              <a:t>8/19/2016</a:t>
             </a:fld>
             <a:endParaRPr lang="en-US"/>
           </a:p>
@@ -725,7 +725,7 @@
             <a:fld id="{89D4E15B-34D2-4B76-969E-640FB2C1DE32}" type="datetimeFigureOut">
               <a:rPr lang="en-US" smtClean="0"/>
               <a:pPr/>
-              <a:t>7/31/2016</a:t>
+              <a:t>8/19/2016</a:t>
             </a:fld>
             <a:endParaRPr lang="en-US"/>
           </a:p>
@@ -892,7 +892,7 @@
             <a:fld id="{89D4E15B-34D2-4B76-969E-640FB2C1DE32}" type="datetimeFigureOut">
               <a:rPr lang="en-US" smtClean="0"/>
               <a:pPr/>
-              <a:t>7/31/2016</a:t>
+              <a:t>8/19/2016</a:t>
             </a:fld>
             <a:endParaRPr lang="en-US"/>
           </a:p>
@@ -1069,7 +1069,7 @@
             <a:fld id="{89D4E15B-34D2-4B76-969E-640FB2C1DE32}" type="datetimeFigureOut">
               <a:rPr lang="en-US" smtClean="0"/>
               <a:pPr/>
-              <a:t>7/31/2016</a:t>
+              <a:t>8/19/2016</a:t>
             </a:fld>
             <a:endParaRPr lang="en-US"/>
           </a:p>
@@ -1236,7 +1236,7 @@
             <a:fld id="{89D4E15B-34D2-4B76-969E-640FB2C1DE32}" type="datetimeFigureOut">
               <a:rPr lang="en-US" smtClean="0"/>
               <a:pPr/>
-              <a:t>7/31/2016</a:t>
+              <a:t>8/19/2016</a:t>
             </a:fld>
             <a:endParaRPr lang="en-US"/>
           </a:p>
@@ -1479,7 +1479,7 @@
             <a:fld id="{89D4E15B-34D2-4B76-969E-640FB2C1DE32}" type="datetimeFigureOut">
               <a:rPr lang="en-US" smtClean="0"/>
               <a:pPr/>
-              <a:t>7/31/2016</a:t>
+              <a:t>8/19/2016</a:t>
             </a:fld>
             <a:endParaRPr lang="en-US"/>
           </a:p>
@@ -1764,7 +1764,7 @@
             <a:fld id="{89D4E15B-34D2-4B76-969E-640FB2C1DE32}" type="datetimeFigureOut">
               <a:rPr lang="en-US" smtClean="0"/>
               <a:pPr/>
-              <a:t>7/31/2016</a:t>
+              <a:t>8/19/2016</a:t>
             </a:fld>
             <a:endParaRPr lang="en-US"/>
           </a:p>
@@ -2188,7 +2188,7 @@
             <a:fld id="{89D4E15B-34D2-4B76-969E-640FB2C1DE32}" type="datetimeFigureOut">
               <a:rPr lang="en-US" smtClean="0"/>
               <a:pPr/>
-              <a:t>7/31/2016</a:t>
+              <a:t>8/19/2016</a:t>
             </a:fld>
             <a:endParaRPr lang="en-US"/>
           </a:p>
@@ -2303,7 +2303,7 @@
             <a:fld id="{89D4E15B-34D2-4B76-969E-640FB2C1DE32}" type="datetimeFigureOut">
               <a:rPr lang="en-US" smtClean="0"/>
               <a:pPr/>
-              <a:t>7/31/2016</a:t>
+              <a:t>8/19/2016</a:t>
             </a:fld>
             <a:endParaRPr lang="en-US"/>
           </a:p>
@@ -2395,7 +2395,7 @@
             <a:fld id="{89D4E15B-34D2-4B76-969E-640FB2C1DE32}" type="datetimeFigureOut">
               <a:rPr lang="en-US" smtClean="0"/>
               <a:pPr/>
-              <a:t>7/31/2016</a:t>
+              <a:t>8/19/2016</a:t>
             </a:fld>
             <a:endParaRPr lang="en-US"/>
           </a:p>
@@ -2669,7 +2669,7 @@
             <a:fld id="{89D4E15B-34D2-4B76-969E-640FB2C1DE32}" type="datetimeFigureOut">
               <a:rPr lang="en-US" smtClean="0"/>
               <a:pPr/>
-              <a:t>7/31/2016</a:t>
+              <a:t>8/19/2016</a:t>
             </a:fld>
             <a:endParaRPr lang="en-US"/>
           </a:p>
@@ -2919,7 +2919,7 @@
             <a:fld id="{89D4E15B-34D2-4B76-969E-640FB2C1DE32}" type="datetimeFigureOut">
               <a:rPr lang="en-US" smtClean="0"/>
               <a:pPr/>
-              <a:t>7/31/2016</a:t>
+              <a:t>8/19/2016</a:t>
             </a:fld>
             <a:endParaRPr lang="en-US"/>
           </a:p>
@@ -3129,7 +3129,7 @@
             <a:fld id="{89D4E15B-34D2-4B76-969E-640FB2C1DE32}" type="datetimeFigureOut">
               <a:rPr lang="en-US" smtClean="0"/>
               <a:pPr/>
-              <a:t>7/31/2016</a:t>
+              <a:t>8/19/2016</a:t>
             </a:fld>
             <a:endParaRPr lang="en-US"/>
           </a:p>
@@ -3584,7 +3584,7 @@
             <a:pPr algn="ctr"/>
             <a:r>
               <a:rPr lang="en-US" sz="1250" dirty="0" smtClean="0"/>
-              <a:t>163</a:t>
+              <a:t>166</a:t>
             </a:r>
             <a:endParaRPr lang="en-US" sz="1250" dirty="0"/>
           </a:p>
@@ -3840,7 +3840,7 @@
             <a:pPr algn="ctr"/>
             <a:r>
               <a:rPr lang="en-US" sz="1250" dirty="0" smtClean="0"/>
-              <a:t>164</a:t>
+              <a:t>167</a:t>
             </a:r>
             <a:endParaRPr lang="en-US" sz="1250" dirty="0"/>
           </a:p>
@@ -3955,7 +3955,7 @@
             <a:pPr algn="ctr"/>
             <a:r>
               <a:rPr lang="en-US" sz="1250" dirty="0" smtClean="0"/>
-              <a:t>169</a:t>
+              <a:t>172</a:t>
             </a:r>
             <a:endParaRPr lang="en-US" sz="1250" dirty="0"/>
           </a:p>
@@ -4248,7 +4248,7 @@
             <a:pPr algn="ctr"/>
             <a:r>
               <a:rPr lang="en-US" sz="1250" dirty="0" smtClean="0"/>
-              <a:t>171</a:t>
+              <a:t>174</a:t>
             </a:r>
             <a:endParaRPr lang="en-US" sz="1250" dirty="0"/>
           </a:p>
@@ -4437,7 +4437,7 @@
             <a:pPr algn="ctr"/>
             <a:r>
               <a:rPr lang="en-US" sz="1250" dirty="0" smtClean="0"/>
-              <a:t>173</a:t>
+              <a:t>176</a:t>
             </a:r>
             <a:endParaRPr lang="en-US" sz="1250" dirty="0"/>
           </a:p>
@@ -4626,7 +4626,7 @@
             <a:pPr algn="ctr"/>
             <a:r>
               <a:rPr lang="en-US" sz="1250" dirty="0" smtClean="0"/>
-              <a:t>175</a:t>
+              <a:t>178</a:t>
             </a:r>
             <a:endParaRPr lang="en-US" sz="1250" dirty="0"/>
           </a:p>
@@ -4889,7 +4889,7 @@
             <a:pPr algn="ctr"/>
             <a:r>
               <a:rPr lang="en-US" sz="1250" dirty="0" smtClean="0"/>
-              <a:t>177</a:t>
+              <a:t>180</a:t>
             </a:r>
             <a:endParaRPr lang="en-US" sz="1250" dirty="0"/>
           </a:p>
@@ -5298,7 +5298,7 @@
             <a:pPr algn="ctr"/>
             <a:r>
               <a:rPr lang="en-US" sz="1250" dirty="0" smtClean="0"/>
-              <a:t>166</a:t>
+              <a:t>169</a:t>
             </a:r>
             <a:endParaRPr lang="en-US" sz="1250" dirty="0"/>
           </a:p>
@@ -5488,7 +5488,7 @@
             <a:pPr algn="ctr"/>
             <a:r>
               <a:rPr lang="en-US" sz="1250" dirty="0" smtClean="0"/>
-              <a:t>167</a:t>
+              <a:t>170</a:t>
             </a:r>
             <a:endParaRPr lang="en-US" sz="1250" dirty="0"/>
           </a:p>
@@ -5640,7 +5640,7 @@
             <a:pPr algn="ctr"/>
             <a:r>
               <a:rPr lang="en-US" sz="1250" dirty="0" smtClean="0"/>
-              <a:t>179</a:t>
+              <a:t>182</a:t>
             </a:r>
             <a:endParaRPr lang="en-US" sz="1250" dirty="0"/>
           </a:p>
@@ -5866,7 +5866,7 @@
             <a:pPr algn="ctr"/>
             <a:r>
               <a:rPr lang="en-US" sz="1250" dirty="0" smtClean="0"/>
-              <a:t>181</a:t>
+              <a:t>184</a:t>
             </a:r>
             <a:endParaRPr lang="en-US" sz="1250" dirty="0"/>
           </a:p>
@@ -6092,7 +6092,7 @@
             <a:pPr algn="ctr"/>
             <a:r>
               <a:rPr lang="en-US" sz="1250" dirty="0" smtClean="0"/>
-              <a:t>183</a:t>
+              <a:t>186</a:t>
             </a:r>
             <a:endParaRPr lang="en-US" sz="1250" dirty="0"/>
           </a:p>
@@ -6317,7 +6317,7 @@
             <a:pPr algn="ctr"/>
             <a:r>
               <a:rPr lang="en-US" sz="1250" dirty="0" smtClean="0"/>
-              <a:t>185</a:t>
+              <a:t>188</a:t>
             </a:r>
             <a:endParaRPr lang="en-US" sz="1250" dirty="0"/>
           </a:p>
@@ -6784,7 +6784,7 @@
           <a:p>
             <a:r>
               <a:rPr lang="en-US" sz="1400" dirty="0" smtClean="0"/>
-              <a:t>165+</a:t>
+              <a:t>168+</a:t>
             </a:r>
             <a:endParaRPr lang="en-US" sz="1400" dirty="0"/>
           </a:p>
@@ -6814,7 +6814,7 @@
           <a:p>
             <a:r>
               <a:rPr lang="en-US" sz="1400" dirty="0" smtClean="0"/>
-              <a:t>172+</a:t>
+              <a:t>175+</a:t>
             </a:r>
             <a:endParaRPr lang="en-US" sz="1400" dirty="0"/>
           </a:p>
@@ -6844,7 +6844,7 @@
           <a:p>
             <a:r>
               <a:rPr lang="en-US" sz="1400" dirty="0" smtClean="0"/>
-              <a:t>170+</a:t>
+              <a:t>173+</a:t>
             </a:r>
             <a:endParaRPr lang="en-US" sz="1400" dirty="0"/>
           </a:p>
@@ -6874,7 +6874,7 @@
           <a:p>
             <a:r>
               <a:rPr lang="en-US" sz="1400" dirty="0" smtClean="0"/>
-              <a:t>168+</a:t>
+              <a:t>171+</a:t>
             </a:r>
             <a:endParaRPr lang="en-US" sz="1400" dirty="0"/>
           </a:p>
@@ -6904,7 +6904,7 @@
           <a:p>
             <a:r>
               <a:rPr lang="en-US" sz="1400" dirty="0" smtClean="0"/>
-              <a:t>174+</a:t>
+              <a:t>177+</a:t>
             </a:r>
             <a:endParaRPr lang="en-US" sz="1400" dirty="0"/>
           </a:p>
@@ -6934,7 +6934,7 @@
           <a:p>
             <a:r>
               <a:rPr lang="en-US" sz="1400" dirty="0" smtClean="0"/>
-              <a:t>176+</a:t>
+              <a:t>179+</a:t>
             </a:r>
             <a:endParaRPr lang="en-US" sz="1400" dirty="0"/>
           </a:p>
@@ -6964,7 +6964,7 @@
           <a:p>
             <a:r>
               <a:rPr lang="en-US" sz="1400" dirty="0" smtClean="0"/>
-              <a:t>180+</a:t>
+              <a:t>183+</a:t>
             </a:r>
             <a:endParaRPr lang="en-US" sz="1400" dirty="0"/>
           </a:p>
@@ -6994,7 +6994,7 @@
           <a:p>
             <a:r>
               <a:rPr lang="en-US" sz="1400" dirty="0" smtClean="0"/>
-              <a:t>178+</a:t>
+              <a:t>181+</a:t>
             </a:r>
             <a:endParaRPr lang="en-US" sz="1400" dirty="0"/>
           </a:p>
@@ -7024,7 +7024,7 @@
           <a:p>
             <a:r>
               <a:rPr lang="en-US" sz="1400" dirty="0" smtClean="0"/>
-              <a:t>182+</a:t>
+              <a:t>185+</a:t>
             </a:r>
             <a:endParaRPr lang="en-US" sz="1400" dirty="0"/>
           </a:p>
@@ -7054,7 +7054,7 @@
           <a:p>
             <a:r>
               <a:rPr lang="en-US" sz="1400" dirty="0" smtClean="0"/>
-              <a:t>184+</a:t>
+              <a:t>187+</a:t>
             </a:r>
             <a:endParaRPr lang="en-US" sz="1400" dirty="0"/>
           </a:p>
@@ -7084,7 +7084,7 @@
           <a:p>
             <a:r>
               <a:rPr lang="en-US" sz="1400" dirty="0" smtClean="0"/>
-              <a:t>186+</a:t>
+              <a:t>189+</a:t>
             </a:r>
             <a:endParaRPr lang="en-US" sz="1400" dirty="0"/>
           </a:p>
@@ -7199,7 +7199,7 @@
             <a:pPr algn="ctr"/>
             <a:r>
               <a:rPr lang="en-US" sz="1250" dirty="0" smtClean="0"/>
-              <a:t>187</a:t>
+              <a:t>190</a:t>
             </a:r>
             <a:endParaRPr lang="en-US" sz="1250" dirty="0"/>
           </a:p>
@@ -7462,7 +7462,7 @@
             <a:pPr algn="ctr"/>
             <a:r>
               <a:rPr lang="en-US" sz="1250" dirty="0" smtClean="0"/>
-              <a:t>190</a:t>
+              <a:t>194</a:t>
             </a:r>
             <a:endParaRPr lang="en-US" sz="1250" dirty="0"/>
           </a:p>
@@ -7654,7 +7654,7 @@
         </p:nvSpPr>
         <p:spPr>
           <a:xfrm>
-            <a:off x="1828800" y="838201"/>
+            <a:off x="762000" y="838200"/>
             <a:ext cx="685800" cy="369332"/>
           </a:xfrm>
           <a:prstGeom prst="rect">
@@ -7719,7 +7719,7 @@
             <a:pPr algn="ctr"/>
             <a:r>
               <a:rPr lang="en-US" sz="1250" dirty="0" smtClean="0"/>
-              <a:t>192</a:t>
+              <a:t>197</a:t>
             </a:r>
             <a:endParaRPr lang="en-US" sz="1250" dirty="0"/>
           </a:p>
@@ -7911,7 +7911,7 @@
         </p:nvSpPr>
         <p:spPr>
           <a:xfrm>
-            <a:off x="1828800" y="1828801"/>
+            <a:off x="685800" y="1828800"/>
             <a:ext cx="685800" cy="369332"/>
           </a:xfrm>
           <a:prstGeom prst="rect">
@@ -7976,7 +7976,7 @@
             <a:pPr algn="ctr"/>
             <a:r>
               <a:rPr lang="en-US" sz="1250" dirty="0" smtClean="0"/>
-              <a:t>194</a:t>
+              <a:t>200</a:t>
             </a:r>
             <a:endParaRPr lang="en-US" sz="1250" dirty="0"/>
           </a:p>
@@ -8168,7 +8168,7 @@
         </p:nvSpPr>
         <p:spPr>
           <a:xfrm>
-            <a:off x="1828800" y="2743201"/>
+            <a:off x="762000" y="2743200"/>
             <a:ext cx="685800" cy="369332"/>
           </a:xfrm>
           <a:prstGeom prst="rect">
@@ -8197,114 +8197,6 @@
           </a:p>
         </p:txBody>
       </p:sp>
-      <p:cxnSp>
-        <p:nvCxnSpPr>
-          <p:cNvPr id="271" name="Shape 270"/>
-          <p:cNvCxnSpPr>
-            <a:stCxn id="88" idx="4"/>
-            <a:endCxn id="127" idx="2"/>
-          </p:cNvCxnSpPr>
-          <p:nvPr/>
-        </p:nvCxnSpPr>
-        <p:spPr>
-          <a:xfrm rot="16200000" flipH="1">
-            <a:off x="1866899" y="495301"/>
-            <a:ext cx="609602" cy="838200"/>
-          </a:xfrm>
-          <a:prstGeom prst="bentConnector2">
-            <a:avLst/>
-          </a:prstGeom>
-          <a:ln>
-            <a:tailEnd type="arrow"/>
-          </a:ln>
-        </p:spPr>
-        <p:style>
-          <a:lnRef idx="1">
-            <a:schemeClr val="dk1"/>
-          </a:lnRef>
-          <a:fillRef idx="0">
-            <a:schemeClr val="dk1"/>
-          </a:fillRef>
-          <a:effectRef idx="0">
-            <a:schemeClr val="dk1"/>
-          </a:effectRef>
-          <a:fontRef idx="minor">
-            <a:schemeClr val="tx1"/>
-          </a:fontRef>
-        </p:style>
-      </p:cxnSp>
-      <p:cxnSp>
-        <p:nvCxnSpPr>
-          <p:cNvPr id="273" name="Elbow Connector 272"/>
-          <p:cNvCxnSpPr>
-            <a:stCxn id="88" idx="4"/>
-            <a:endCxn id="170" idx="2"/>
-          </p:cNvCxnSpPr>
-          <p:nvPr/>
-        </p:nvCxnSpPr>
-        <p:spPr>
-          <a:xfrm rot="16200000" flipH="1">
-            <a:off x="1371599" y="990601"/>
-            <a:ext cx="1600202" cy="838200"/>
-          </a:xfrm>
-          <a:prstGeom prst="bentConnector2">
-            <a:avLst/>
-          </a:prstGeom>
-          <a:ln>
-            <a:tailEnd type="arrow"/>
-          </a:ln>
-        </p:spPr>
-        <p:style>
-          <a:lnRef idx="1">
-            <a:schemeClr val="dk1"/>
-          </a:lnRef>
-          <a:fillRef idx="0">
-            <a:schemeClr val="dk1"/>
-          </a:fillRef>
-          <a:effectRef idx="0">
-            <a:schemeClr val="dk1"/>
-          </a:effectRef>
-          <a:fontRef idx="minor">
-            <a:schemeClr val="tx1"/>
-          </a:fontRef>
-        </p:style>
-      </p:cxnSp>
-      <p:cxnSp>
-        <p:nvCxnSpPr>
-          <p:cNvPr id="276" name="Shape 275"/>
-          <p:cNvCxnSpPr>
-            <a:stCxn id="88" idx="4"/>
-            <a:endCxn id="181" idx="2"/>
-          </p:cNvCxnSpPr>
-          <p:nvPr/>
-        </p:nvCxnSpPr>
-        <p:spPr>
-          <a:xfrm rot="16200000" flipH="1">
-            <a:off x="914399" y="1447801"/>
-            <a:ext cx="2514602" cy="838200"/>
-          </a:xfrm>
-          <a:prstGeom prst="bentConnector2">
-            <a:avLst/>
-          </a:prstGeom>
-          <a:ln>
-            <a:tailEnd type="arrow"/>
-          </a:ln>
-        </p:spPr>
-        <p:style>
-          <a:lnRef idx="1">
-            <a:schemeClr val="dk1"/>
-          </a:lnRef>
-          <a:fillRef idx="0">
-            <a:schemeClr val="dk1"/>
-          </a:fillRef>
-          <a:effectRef idx="0">
-            <a:schemeClr val="dk1"/>
-          </a:effectRef>
-          <a:fontRef idx="minor">
-            <a:schemeClr val="tx1"/>
-          </a:fontRef>
-        </p:style>
-      </p:cxnSp>
       <p:sp>
         <p:nvSpPr>
           <p:cNvPr id="287" name="Oval 286"/>
@@ -8341,7 +8233,7 @@
             <a:pPr algn="ctr"/>
             <a:r>
               <a:rPr lang="en-US" sz="1250" dirty="0" smtClean="0"/>
-              <a:t>188</a:t>
+              <a:t>191</a:t>
             </a:r>
             <a:endParaRPr lang="en-US" sz="1250" dirty="0"/>
           </a:p>
@@ -8456,7 +8348,7 @@
             <a:pPr algn="ctr"/>
             <a:r>
               <a:rPr lang="en-US" sz="1250" dirty="0" smtClean="0"/>
-              <a:t>196</a:t>
+              <a:t>202</a:t>
             </a:r>
             <a:endParaRPr lang="en-US" sz="1250" dirty="0"/>
           </a:p>
@@ -8756,7 +8648,7 @@
             <a:pPr algn="ctr"/>
             <a:r>
               <a:rPr lang="en-US" sz="1250" dirty="0" smtClean="0"/>
-              <a:t>198</a:t>
+              <a:t>204</a:t>
             </a:r>
             <a:endParaRPr lang="en-US" sz="1250" dirty="0"/>
           </a:p>
@@ -9462,7 +9354,7 @@
             <a:pPr algn="ctr"/>
             <a:r>
               <a:rPr lang="en-US" sz="1250" dirty="0" smtClean="0"/>
-              <a:t>200</a:t>
+              <a:t>206</a:t>
             </a:r>
             <a:endParaRPr lang="en-US" sz="1250" dirty="0"/>
           </a:p>
@@ -9504,7 +9396,7 @@
             <a:pPr algn="ctr"/>
             <a:r>
               <a:rPr lang="en-US" sz="1250" dirty="0" smtClean="0"/>
-              <a:t>202</a:t>
+              <a:t>208</a:t>
             </a:r>
             <a:endParaRPr lang="en-US" sz="1250" dirty="0"/>
           </a:p>
@@ -9654,7 +9546,7 @@
             <a:pPr algn="ctr"/>
             <a:r>
               <a:rPr lang="en-US" sz="1250" dirty="0" smtClean="0"/>
-              <a:t>204</a:t>
+              <a:t>210</a:t>
             </a:r>
             <a:endParaRPr lang="en-US" sz="1250" dirty="0"/>
           </a:p>
@@ -9696,7 +9588,7 @@
             <a:pPr algn="ctr"/>
             <a:r>
               <a:rPr lang="en-US" sz="1250" dirty="0" smtClean="0"/>
-              <a:t>206</a:t>
+              <a:t>212</a:t>
             </a:r>
             <a:endParaRPr lang="en-US" sz="1250" dirty="0"/>
           </a:p>
@@ -10033,7 +9925,7 @@
             <a:pPr algn="ctr"/>
             <a:r>
               <a:rPr lang="en-US" sz="1250" dirty="0" smtClean="0"/>
-              <a:t>208</a:t>
+              <a:t>214</a:t>
             </a:r>
             <a:endParaRPr lang="en-US" sz="1250" dirty="0"/>
           </a:p>
@@ -10260,7 +10152,7 @@
             <a:pPr algn="ctr"/>
             <a:r>
               <a:rPr lang="en-US" sz="1250" dirty="0" smtClean="0"/>
-              <a:t>210</a:t>
+              <a:t>216</a:t>
             </a:r>
             <a:endParaRPr lang="en-US" sz="1250" dirty="0"/>
           </a:p>
@@ -10547,7 +10439,7 @@
           <a:p>
             <a:r>
               <a:rPr lang="en-US" sz="1400" dirty="0" smtClean="0"/>
-              <a:t>189+</a:t>
+              <a:t>192+</a:t>
             </a:r>
             <a:endParaRPr lang="en-US" sz="1400" dirty="0"/>
           </a:p>
@@ -10577,7 +10469,7 @@
           <a:p>
             <a:r>
               <a:rPr lang="en-US" sz="1400" dirty="0" smtClean="0"/>
-              <a:t>191+</a:t>
+              <a:t>195+</a:t>
             </a:r>
             <a:endParaRPr lang="en-US" sz="1400" dirty="0"/>
           </a:p>
@@ -10607,7 +10499,7 @@
           <a:p>
             <a:r>
               <a:rPr lang="en-US" sz="1400" dirty="0" smtClean="0"/>
-              <a:t>193+</a:t>
+              <a:t>198+</a:t>
             </a:r>
             <a:endParaRPr lang="en-US" sz="1400" dirty="0"/>
           </a:p>
@@ -10637,7 +10529,11 @@
           <a:p>
             <a:r>
               <a:rPr lang="en-US" sz="1400" dirty="0" smtClean="0"/>
-              <a:t>195+</a:t>
+              <a:t>201</a:t>
+            </a:r>
+            <a:r>
+              <a:rPr lang="en-US" sz="1400" dirty="0" smtClean="0"/>
+              <a:t>+</a:t>
             </a:r>
             <a:endParaRPr lang="en-US" sz="1400" dirty="0"/>
           </a:p>
@@ -10667,7 +10563,7 @@
           <a:p>
             <a:r>
               <a:rPr lang="en-US" sz="1400" dirty="0" smtClean="0"/>
-              <a:t>197+</a:t>
+              <a:t>203+</a:t>
             </a:r>
             <a:endParaRPr lang="en-US" sz="1400" dirty="0"/>
           </a:p>
@@ -10697,7 +10593,11 @@
           <a:p>
             <a:r>
               <a:rPr lang="en-US" sz="1400" dirty="0" smtClean="0"/>
-              <a:t>199+</a:t>
+              <a:t>205</a:t>
+            </a:r>
+            <a:r>
+              <a:rPr lang="en-US" sz="1400" dirty="0" smtClean="0"/>
+              <a:t>+</a:t>
             </a:r>
             <a:endParaRPr lang="en-US" sz="1400" dirty="0"/>
           </a:p>
@@ -10727,11 +10627,7 @@
           <a:p>
             <a:r>
               <a:rPr lang="en-US" sz="1400" dirty="0" smtClean="0"/>
-              <a:t>201</a:t>
-            </a:r>
-            <a:r>
-              <a:rPr lang="en-US" sz="1400" dirty="0" smtClean="0"/>
-              <a:t>+</a:t>
+              <a:t>207+</a:t>
             </a:r>
             <a:endParaRPr lang="en-US" sz="1400" dirty="0"/>
           </a:p>
@@ -10761,7 +10657,7 @@
           <a:p>
             <a:r>
               <a:rPr lang="en-US" sz="1400" dirty="0" smtClean="0"/>
-              <a:t>203+</a:t>
+              <a:t>209+</a:t>
             </a:r>
             <a:endParaRPr lang="en-US" sz="1400" dirty="0"/>
           </a:p>
@@ -10791,7 +10687,7 @@
           <a:p>
             <a:r>
               <a:rPr lang="en-US" sz="1400" dirty="0" smtClean="0"/>
-              <a:t>205+</a:t>
+              <a:t>211+</a:t>
             </a:r>
             <a:endParaRPr lang="en-US" sz="1400" dirty="0"/>
           </a:p>
@@ -10821,7 +10717,7 @@
           <a:p>
             <a:r>
               <a:rPr lang="en-US" sz="1400" dirty="0" smtClean="0"/>
-              <a:t>207+</a:t>
+              <a:t>213+</a:t>
             </a:r>
             <a:endParaRPr lang="en-US" sz="1400" dirty="0"/>
           </a:p>
@@ -10851,7 +10747,7 @@
           <a:p>
             <a:r>
               <a:rPr lang="en-US" sz="1400" dirty="0" smtClean="0"/>
-              <a:t>209+</a:t>
+              <a:t>215+</a:t>
             </a:r>
             <a:endParaRPr lang="en-US" sz="1400" dirty="0"/>
           </a:p>
@@ -10881,9 +10777,450 @@
           <a:p>
             <a:r>
               <a:rPr lang="en-US" sz="1400" dirty="0" smtClean="0"/>
-              <a:t>211+</a:t>
+              <a:t>217+</a:t>
             </a:r>
             <a:endParaRPr lang="en-US" sz="1400" dirty="0"/>
+          </a:p>
+        </p:txBody>
+      </p:sp>
+      <p:cxnSp>
+        <p:nvCxnSpPr>
+          <p:cNvPr id="142" name="Straight Arrow Connector 141"/>
+          <p:cNvCxnSpPr/>
+          <p:nvPr/>
+        </p:nvCxnSpPr>
+        <p:spPr>
+          <a:xfrm>
+            <a:off x="2057400" y="3124200"/>
+            <a:ext cx="533400" cy="1"/>
+          </a:xfrm>
+          <a:prstGeom prst="straightConnector1">
+            <a:avLst/>
+          </a:prstGeom>
+          <a:ln>
+            <a:tailEnd type="arrow"/>
+          </a:ln>
+        </p:spPr>
+        <p:style>
+          <a:lnRef idx="1">
+            <a:schemeClr val="dk1"/>
+          </a:lnRef>
+          <a:fillRef idx="0">
+            <a:schemeClr val="dk1"/>
+          </a:fillRef>
+          <a:effectRef idx="0">
+            <a:schemeClr val="dk1"/>
+          </a:effectRef>
+          <a:fontRef idx="minor">
+            <a:schemeClr val="tx1"/>
+          </a:fontRef>
+        </p:style>
+      </p:cxnSp>
+      <p:cxnSp>
+        <p:nvCxnSpPr>
+          <p:cNvPr id="143" name="Straight Arrow Connector 142"/>
+          <p:cNvCxnSpPr/>
+          <p:nvPr/>
+        </p:nvCxnSpPr>
+        <p:spPr>
+          <a:xfrm>
+            <a:off x="2057400" y="2209800"/>
+            <a:ext cx="533400" cy="1"/>
+          </a:xfrm>
+          <a:prstGeom prst="straightConnector1">
+            <a:avLst/>
+          </a:prstGeom>
+          <a:ln>
+            <a:tailEnd type="arrow"/>
+          </a:ln>
+        </p:spPr>
+        <p:style>
+          <a:lnRef idx="1">
+            <a:schemeClr val="dk1"/>
+          </a:lnRef>
+          <a:fillRef idx="0">
+            <a:schemeClr val="dk1"/>
+          </a:fillRef>
+          <a:effectRef idx="0">
+            <a:schemeClr val="dk1"/>
+          </a:effectRef>
+          <a:fontRef idx="minor">
+            <a:schemeClr val="tx1"/>
+          </a:fontRef>
+        </p:style>
+      </p:cxnSp>
+      <p:cxnSp>
+        <p:nvCxnSpPr>
+          <p:cNvPr id="144" name="Straight Arrow Connector 143"/>
+          <p:cNvCxnSpPr/>
+          <p:nvPr/>
+        </p:nvCxnSpPr>
+        <p:spPr>
+          <a:xfrm>
+            <a:off x="2057400" y="1219200"/>
+            <a:ext cx="533400" cy="1"/>
+          </a:xfrm>
+          <a:prstGeom prst="straightConnector1">
+            <a:avLst/>
+          </a:prstGeom>
+          <a:ln>
+            <a:tailEnd type="arrow"/>
+          </a:ln>
+        </p:spPr>
+        <p:style>
+          <a:lnRef idx="1">
+            <a:schemeClr val="dk1"/>
+          </a:lnRef>
+          <a:fillRef idx="0">
+            <a:schemeClr val="dk1"/>
+          </a:fillRef>
+          <a:effectRef idx="0">
+            <a:schemeClr val="dk1"/>
+          </a:effectRef>
+          <a:fontRef idx="minor">
+            <a:schemeClr val="tx1"/>
+          </a:fontRef>
+        </p:style>
+      </p:cxnSp>
+      <p:sp>
+        <p:nvSpPr>
+          <p:cNvPr id="146" name="Oval 145"/>
+          <p:cNvSpPr/>
+          <p:nvPr/>
+        </p:nvSpPr>
+        <p:spPr>
+          <a:xfrm>
+            <a:off x="1447800" y="914400"/>
+            <a:ext cx="609600" cy="609601"/>
+          </a:xfrm>
+          <a:prstGeom prst="ellipse">
+            <a:avLst/>
+          </a:prstGeom>
+        </p:spPr>
+        <p:style>
+          <a:lnRef idx="2">
+            <a:schemeClr val="dk1"/>
+          </a:lnRef>
+          <a:fillRef idx="1">
+            <a:schemeClr val="lt1"/>
+          </a:fillRef>
+          <a:effectRef idx="0">
+            <a:schemeClr val="dk1"/>
+          </a:effectRef>
+          <a:fontRef idx="minor">
+            <a:schemeClr val="dk1"/>
+          </a:fontRef>
+        </p:style>
+        <p:txBody>
+          <a:bodyPr rtlCol="0" anchor="ctr"/>
+          <a:lstStyle/>
+          <a:p>
+            <a:pPr algn="ctr"/>
+            <a:r>
+              <a:rPr lang="en-US" sz="1250" dirty="0" smtClean="0"/>
+              <a:t>193</a:t>
+            </a:r>
+            <a:endParaRPr lang="en-US" sz="1250" dirty="0"/>
+          </a:p>
+        </p:txBody>
+      </p:sp>
+      <p:sp>
+        <p:nvSpPr>
+          <p:cNvPr id="147" name="Oval 146"/>
+          <p:cNvSpPr/>
+          <p:nvPr/>
+        </p:nvSpPr>
+        <p:spPr>
+          <a:xfrm>
+            <a:off x="1447800" y="1905000"/>
+            <a:ext cx="609600" cy="609601"/>
+          </a:xfrm>
+          <a:prstGeom prst="ellipse">
+            <a:avLst/>
+          </a:prstGeom>
+        </p:spPr>
+        <p:style>
+          <a:lnRef idx="2">
+            <a:schemeClr val="dk1"/>
+          </a:lnRef>
+          <a:fillRef idx="1">
+            <a:schemeClr val="lt1"/>
+          </a:fillRef>
+          <a:effectRef idx="0">
+            <a:schemeClr val="dk1"/>
+          </a:effectRef>
+          <a:fontRef idx="minor">
+            <a:schemeClr val="dk1"/>
+          </a:fontRef>
+        </p:style>
+        <p:txBody>
+          <a:bodyPr rtlCol="0" anchor="ctr"/>
+          <a:lstStyle/>
+          <a:p>
+            <a:pPr algn="ctr"/>
+            <a:r>
+              <a:rPr lang="en-US" sz="1250" dirty="0" smtClean="0"/>
+              <a:t>196</a:t>
+            </a:r>
+            <a:endParaRPr lang="en-US" sz="1250" dirty="0"/>
+          </a:p>
+        </p:txBody>
+      </p:sp>
+      <p:sp>
+        <p:nvSpPr>
+          <p:cNvPr id="148" name="Oval 147"/>
+          <p:cNvSpPr/>
+          <p:nvPr/>
+        </p:nvSpPr>
+        <p:spPr>
+          <a:xfrm>
+            <a:off x="1447800" y="2819400"/>
+            <a:ext cx="609600" cy="609601"/>
+          </a:xfrm>
+          <a:prstGeom prst="ellipse">
+            <a:avLst/>
+          </a:prstGeom>
+        </p:spPr>
+        <p:style>
+          <a:lnRef idx="2">
+            <a:schemeClr val="dk1"/>
+          </a:lnRef>
+          <a:fillRef idx="1">
+            <a:schemeClr val="lt1"/>
+          </a:fillRef>
+          <a:effectRef idx="0">
+            <a:schemeClr val="dk1"/>
+          </a:effectRef>
+          <a:fontRef idx="minor">
+            <a:schemeClr val="dk1"/>
+          </a:fontRef>
+        </p:style>
+        <p:txBody>
+          <a:bodyPr rtlCol="0" anchor="ctr"/>
+          <a:lstStyle/>
+          <a:p>
+            <a:pPr algn="ctr"/>
+            <a:r>
+              <a:rPr lang="en-US" sz="1250" dirty="0" smtClean="0"/>
+              <a:t>199</a:t>
+            </a:r>
+            <a:endParaRPr lang="en-US" sz="1250" dirty="0"/>
+          </a:p>
+        </p:txBody>
+      </p:sp>
+      <p:cxnSp>
+        <p:nvCxnSpPr>
+          <p:cNvPr id="149" name="Straight Arrow Connector 148"/>
+          <p:cNvCxnSpPr>
+            <a:endCxn id="146" idx="2"/>
+          </p:cNvCxnSpPr>
+          <p:nvPr/>
+        </p:nvCxnSpPr>
+        <p:spPr>
+          <a:xfrm>
+            <a:off x="685800" y="1219200"/>
+            <a:ext cx="762000" cy="1"/>
+          </a:xfrm>
+          <a:prstGeom prst="straightConnector1">
+            <a:avLst/>
+          </a:prstGeom>
+          <a:ln>
+            <a:tailEnd type="arrow"/>
+          </a:ln>
+        </p:spPr>
+        <p:style>
+          <a:lnRef idx="1">
+            <a:schemeClr val="dk1"/>
+          </a:lnRef>
+          <a:fillRef idx="0">
+            <a:schemeClr val="dk1"/>
+          </a:fillRef>
+          <a:effectRef idx="0">
+            <a:schemeClr val="dk1"/>
+          </a:effectRef>
+          <a:fontRef idx="minor">
+            <a:schemeClr val="tx1"/>
+          </a:fontRef>
+        </p:style>
+      </p:cxnSp>
+      <p:cxnSp>
+        <p:nvCxnSpPr>
+          <p:cNvPr id="151" name="Straight Arrow Connector 150"/>
+          <p:cNvCxnSpPr>
+            <a:endCxn id="147" idx="2"/>
+          </p:cNvCxnSpPr>
+          <p:nvPr/>
+        </p:nvCxnSpPr>
+        <p:spPr>
+          <a:xfrm>
+            <a:off x="685800" y="2209800"/>
+            <a:ext cx="762000" cy="1"/>
+          </a:xfrm>
+          <a:prstGeom prst="straightConnector1">
+            <a:avLst/>
+          </a:prstGeom>
+          <a:ln>
+            <a:tailEnd type="arrow"/>
+          </a:ln>
+        </p:spPr>
+        <p:style>
+          <a:lnRef idx="1">
+            <a:schemeClr val="dk1"/>
+          </a:lnRef>
+          <a:fillRef idx="0">
+            <a:schemeClr val="dk1"/>
+          </a:fillRef>
+          <a:effectRef idx="0">
+            <a:schemeClr val="dk1"/>
+          </a:effectRef>
+          <a:fontRef idx="minor">
+            <a:schemeClr val="tx1"/>
+          </a:fontRef>
+        </p:style>
+      </p:cxnSp>
+      <p:cxnSp>
+        <p:nvCxnSpPr>
+          <p:cNvPr id="153" name="Straight Arrow Connector 152"/>
+          <p:cNvCxnSpPr>
+            <a:endCxn id="148" idx="2"/>
+          </p:cNvCxnSpPr>
+          <p:nvPr/>
+        </p:nvCxnSpPr>
+        <p:spPr>
+          <a:xfrm>
+            <a:off x="685800" y="3124200"/>
+            <a:ext cx="762000" cy="1"/>
+          </a:xfrm>
+          <a:prstGeom prst="straightConnector1">
+            <a:avLst/>
+          </a:prstGeom>
+          <a:ln>
+            <a:tailEnd type="arrow"/>
+          </a:ln>
+        </p:spPr>
+        <p:style>
+          <a:lnRef idx="1">
+            <a:schemeClr val="dk1"/>
+          </a:lnRef>
+          <a:fillRef idx="0">
+            <a:schemeClr val="dk1"/>
+          </a:fillRef>
+          <a:effectRef idx="0">
+            <a:schemeClr val="dk1"/>
+          </a:effectRef>
+          <a:fontRef idx="minor">
+            <a:schemeClr val="tx1"/>
+          </a:fontRef>
+        </p:style>
+      </p:cxnSp>
+      <p:sp>
+        <p:nvSpPr>
+          <p:cNvPr id="155" name="TextBox 154"/>
+          <p:cNvSpPr txBox="1"/>
+          <p:nvPr/>
+        </p:nvSpPr>
+        <p:spPr>
+          <a:xfrm>
+            <a:off x="1981200" y="838200"/>
+            <a:ext cx="685800" cy="369332"/>
+          </a:xfrm>
+          <a:prstGeom prst="rect">
+            <a:avLst/>
+          </a:prstGeom>
+          <a:noFill/>
+        </p:spPr>
+        <p:txBody>
+          <a:bodyPr wrap="square" rtlCol="0">
+            <a:spAutoFit/>
+          </a:bodyPr>
+          <a:lstStyle/>
+          <a:p>
+            <a:pPr algn="ctr"/>
+            <a:r>
+              <a:rPr lang="en-US" dirty="0" smtClean="0">
+                <a:latin typeface="Arial" pitchFamily="34" charset="0"/>
+                <a:cs typeface="Arial" pitchFamily="34" charset="0"/>
+              </a:rPr>
+              <a:t>=</a:t>
+            </a:r>
+            <a:endParaRPr lang="en-US" dirty="0">
+              <a:latin typeface="Arial" pitchFamily="34" charset="0"/>
+              <a:cs typeface="Arial" pitchFamily="34" charset="0"/>
+            </a:endParaRPr>
+          </a:p>
+        </p:txBody>
+      </p:sp>
+      <p:sp>
+        <p:nvSpPr>
+          <p:cNvPr id="156" name="TextBox 155"/>
+          <p:cNvSpPr txBox="1"/>
+          <p:nvPr/>
+        </p:nvSpPr>
+        <p:spPr>
+          <a:xfrm>
+            <a:off x="1981200" y="1828800"/>
+            <a:ext cx="685800" cy="369332"/>
+          </a:xfrm>
+          <a:prstGeom prst="rect">
+            <a:avLst/>
+          </a:prstGeom>
+          <a:noFill/>
+        </p:spPr>
+        <p:txBody>
+          <a:bodyPr wrap="square" rtlCol="0">
+            <a:spAutoFit/>
+          </a:bodyPr>
+          <a:lstStyle/>
+          <a:p>
+            <a:pPr algn="ctr"/>
+            <a:r>
+              <a:rPr lang="en-US" dirty="0" smtClean="0">
+                <a:latin typeface="Arial" pitchFamily="34" charset="0"/>
+                <a:cs typeface="Arial" pitchFamily="34" charset="0"/>
+              </a:rPr>
+              <a:t>=</a:t>
+            </a:r>
+            <a:endParaRPr lang="en-US" dirty="0">
+              <a:latin typeface="Arial" pitchFamily="34" charset="0"/>
+              <a:cs typeface="Arial" pitchFamily="34" charset="0"/>
+            </a:endParaRPr>
+          </a:p>
+        </p:txBody>
+      </p:sp>
+      <p:sp>
+        <p:nvSpPr>
+          <p:cNvPr id="157" name="TextBox 156"/>
+          <p:cNvSpPr txBox="1"/>
+          <p:nvPr/>
+        </p:nvSpPr>
+        <p:spPr>
+          <a:xfrm>
+            <a:off x="1981200" y="2743200"/>
+            <a:ext cx="685800" cy="369332"/>
+          </a:xfrm>
+          <a:prstGeom prst="rect">
+            <a:avLst/>
+          </a:prstGeom>
+          <a:noFill/>
+        </p:spPr>
+        <p:txBody>
+          <a:bodyPr wrap="square" rtlCol="0">
+            <a:spAutoFit/>
+          </a:bodyPr>
+          <a:lstStyle/>
+          <a:p>
+            <a:pPr algn="ctr"/>
+            <a:r>
+              <a:rPr lang="en-US" dirty="0" smtClean="0">
+                <a:latin typeface="Arial" pitchFamily="34" charset="0"/>
+                <a:cs typeface="Arial" pitchFamily="34" charset="0"/>
+              </a:rPr>
+              <a:t>=</a:t>
+            </a:r>
+            <a:endParaRPr lang="en-US" dirty="0">
+              <a:latin typeface="Arial" pitchFamily="34" charset="0"/>
+              <a:cs typeface="Arial" pitchFamily="34" charset="0"/>
+            </a:endParaRPr>
           </a:p>
         </p:txBody>
       </p:sp>
@@ -10996,7 +11333,7 @@
             <a:pPr algn="ctr"/>
             <a:r>
               <a:rPr lang="en-US" sz="1250" dirty="0" smtClean="0"/>
-              <a:t>212</a:t>
+              <a:t>218</a:t>
             </a:r>
             <a:endParaRPr lang="en-US" sz="1250" dirty="0"/>
           </a:p>
@@ -11252,7 +11589,7 @@
             <a:pPr algn="ctr"/>
             <a:r>
               <a:rPr lang="en-US" sz="1250" dirty="0" smtClean="0"/>
-              <a:t>214</a:t>
+              <a:t>220</a:t>
             </a:r>
             <a:endParaRPr lang="en-US" sz="1250" dirty="0"/>
           </a:p>
@@ -11552,7 +11889,7 @@
             <a:pPr algn="ctr"/>
             <a:r>
               <a:rPr lang="en-US" sz="1250" dirty="0" smtClean="0"/>
-              <a:t>218</a:t>
+              <a:t>224</a:t>
             </a:r>
             <a:endParaRPr lang="en-US" sz="1250" dirty="0"/>
           </a:p>
@@ -11632,7 +11969,7 @@
             <a:pPr algn="ctr"/>
             <a:r>
               <a:rPr lang="en-US" sz="1250" dirty="0" smtClean="0"/>
-              <a:t>220</a:t>
+              <a:t>226</a:t>
             </a:r>
             <a:endParaRPr lang="en-US" sz="1250" dirty="0"/>
           </a:p>
@@ -12078,7 +12415,7 @@
             <a:pPr algn="ctr"/>
             <a:r>
               <a:rPr lang="en-US" sz="1250" dirty="0" smtClean="0"/>
-              <a:t>224</a:t>
+              <a:t>230</a:t>
             </a:r>
             <a:endParaRPr lang="en-US" sz="1250" dirty="0"/>
           </a:p>
@@ -12371,7 +12708,7 @@
             <a:pPr algn="ctr"/>
             <a:r>
               <a:rPr lang="en-US" sz="1250" dirty="0" smtClean="0"/>
-              <a:t>228</a:t>
+              <a:t>234</a:t>
             </a:r>
             <a:endParaRPr lang="en-US" sz="1250" dirty="0"/>
           </a:p>
@@ -12634,7 +12971,7 @@
             <a:pPr algn="ctr"/>
             <a:r>
               <a:rPr lang="en-US" sz="1250" dirty="0" smtClean="0"/>
-              <a:t>216</a:t>
+              <a:t>222</a:t>
             </a:r>
             <a:endParaRPr lang="en-US" sz="1250" dirty="0"/>
           </a:p>
@@ -12897,7 +13234,7 @@
             <a:pPr algn="ctr"/>
             <a:r>
               <a:rPr lang="en-US" sz="1250" dirty="0" smtClean="0"/>
-              <a:t>222</a:t>
+              <a:t>228</a:t>
             </a:r>
             <a:endParaRPr lang="en-US" sz="1250" dirty="0"/>
           </a:p>
@@ -13160,7 +13497,7 @@
             <a:pPr algn="ctr"/>
             <a:r>
               <a:rPr lang="en-US" sz="1250" dirty="0" smtClean="0"/>
-              <a:t>226</a:t>
+              <a:t>232</a:t>
             </a:r>
             <a:endParaRPr lang="en-US" sz="1250" dirty="0"/>
           </a:p>
@@ -13387,7 +13724,7 @@
             <a:pPr algn="ctr"/>
             <a:r>
               <a:rPr lang="en-US" sz="1250" dirty="0" smtClean="0"/>
-              <a:t>230</a:t>
+              <a:t>236</a:t>
             </a:r>
             <a:endParaRPr lang="en-US" sz="1250" dirty="0"/>
           </a:p>
@@ -13686,7 +14023,7 @@
             <a:pPr algn="ctr"/>
             <a:r>
               <a:rPr lang="en-US" sz="1250" dirty="0" smtClean="0"/>
-              <a:t>232</a:t>
+              <a:t>238</a:t>
             </a:r>
             <a:endParaRPr lang="en-US" sz="1250" dirty="0"/>
           </a:p>
@@ -13949,7 +14286,7 @@
             <a:pPr algn="ctr"/>
             <a:r>
               <a:rPr lang="en-US" sz="1250" dirty="0" smtClean="0"/>
-              <a:t>234</a:t>
+              <a:t>240</a:t>
             </a:r>
             <a:endParaRPr lang="en-US" sz="1250" dirty="0"/>
           </a:p>
@@ -14176,7 +14513,7 @@
             <a:pPr algn="ctr"/>
             <a:r>
               <a:rPr lang="en-US" sz="1250" dirty="0" smtClean="0"/>
-              <a:t>236</a:t>
+              <a:t>242</a:t>
             </a:r>
             <a:endParaRPr lang="en-US" sz="1250" dirty="0"/>
           </a:p>
@@ -14463,7 +14800,7 @@
           <a:p>
             <a:r>
               <a:rPr lang="en-US" sz="1400" dirty="0" smtClean="0"/>
-              <a:t>213+</a:t>
+              <a:t>219+</a:t>
             </a:r>
             <a:endParaRPr lang="en-US" sz="1400" dirty="0"/>
           </a:p>
@@ -14493,7 +14830,7 @@
           <a:p>
             <a:r>
               <a:rPr lang="en-US" sz="1400" dirty="0" smtClean="0"/>
-              <a:t>215+</a:t>
+              <a:t>221+</a:t>
             </a:r>
             <a:endParaRPr lang="en-US" sz="1400" dirty="0"/>
           </a:p>
@@ -14523,7 +14860,7 @@
           <a:p>
             <a:r>
               <a:rPr lang="en-US" sz="1400" dirty="0" smtClean="0"/>
-              <a:t>217+</a:t>
+              <a:t>223+</a:t>
             </a:r>
             <a:endParaRPr lang="en-US" sz="1400" dirty="0"/>
           </a:p>
@@ -14553,7 +14890,7 @@
           <a:p>
             <a:r>
               <a:rPr lang="en-US" sz="1400" dirty="0" smtClean="0"/>
-              <a:t>219+</a:t>
+              <a:t>225+</a:t>
             </a:r>
             <a:endParaRPr lang="en-US" sz="1400" dirty="0"/>
           </a:p>
@@ -14583,7 +14920,7 @@
           <a:p>
             <a:r>
               <a:rPr lang="en-US" sz="1400" dirty="0" smtClean="0"/>
-              <a:t>221+</a:t>
+              <a:t>227+</a:t>
             </a:r>
             <a:endParaRPr lang="en-US" sz="1400" dirty="0"/>
           </a:p>
@@ -14613,7 +14950,7 @@
           <a:p>
             <a:r>
               <a:rPr lang="en-US" sz="1400" dirty="0" smtClean="0"/>
-              <a:t>223+</a:t>
+              <a:t>229+</a:t>
             </a:r>
             <a:endParaRPr lang="en-US" sz="1400" dirty="0"/>
           </a:p>
@@ -14643,7 +14980,7 @@
           <a:p>
             <a:r>
               <a:rPr lang="en-US" sz="1400" dirty="0" smtClean="0"/>
-              <a:t>225+</a:t>
+              <a:t>231+</a:t>
             </a:r>
             <a:endParaRPr lang="en-US" sz="1400" dirty="0"/>
           </a:p>
@@ -14673,7 +15010,7 @@
           <a:p>
             <a:r>
               <a:rPr lang="en-US" sz="1400" dirty="0" smtClean="0"/>
-              <a:t>227+</a:t>
+              <a:t>233+</a:t>
             </a:r>
             <a:endParaRPr lang="en-US" sz="1400" dirty="0"/>
           </a:p>
@@ -14703,7 +15040,7 @@
           <a:p>
             <a:r>
               <a:rPr lang="en-US" sz="1400" dirty="0" smtClean="0"/>
-              <a:t>229+</a:t>
+              <a:t>235+</a:t>
             </a:r>
             <a:endParaRPr lang="en-US" sz="1400" dirty="0"/>
           </a:p>
@@ -14733,7 +15070,7 @@
           <a:p>
             <a:r>
               <a:rPr lang="en-US" sz="1400" dirty="0" smtClean="0"/>
-              <a:t>231+</a:t>
+              <a:t>237+</a:t>
             </a:r>
             <a:endParaRPr lang="en-US" sz="1400" dirty="0"/>
           </a:p>
@@ -14763,9 +15100,8 @@
           <a:p>
             <a:r>
               <a:rPr lang="en-US" sz="1400" dirty="0" smtClean="0"/>
-              <a:t>233+</a:t>
-            </a:r>
-            <a:endParaRPr lang="en-US" sz="1400" dirty="0"/>
+              <a:t>239+</a:t>
+            </a:r>
           </a:p>
         </p:txBody>
       </p:sp>
@@ -14793,7 +15129,7 @@
           <a:p>
             <a:r>
               <a:rPr lang="en-US" sz="1400" dirty="0" smtClean="0"/>
-              <a:t>235+</a:t>
+              <a:t>241+</a:t>
             </a:r>
             <a:endParaRPr lang="en-US" sz="1400" dirty="0"/>
           </a:p>
@@ -14822,8 +15158,8 @@
           <a:lstStyle/>
           <a:p>
             <a:r>
-              <a:rPr lang="en-US" sz="1400" dirty="0" smtClean="0"/>
-              <a:t>237+</a:t>
+              <a:rPr lang="en-US" sz="1400" smtClean="0"/>
+              <a:t>243+</a:t>
             </a:r>
             <a:endParaRPr lang="en-US" sz="1400" dirty="0"/>
           </a:p>

</xml_diff>